<commit_message>
Main activity layout (not functional yet)
</commit_message>
<xml_diff>
--- a/Docs/Survive Axon Demo design.pptx
+++ b/Docs/Survive Axon Demo design.pptx
@@ -3028,6 +3028,30 @@
           <a:prstGeom prst="rect">
             <a:avLst/>
           </a:prstGeom>
+          <a:gradFill>
+            <a:gsLst>
+              <a:gs pos="0">
+                <a:schemeClr val="accent6">
+                  <a:lumMod val="60000"/>
+                  <a:lumOff val="40000"/>
+                </a:schemeClr>
+              </a:gs>
+              <a:gs pos="50000">
+                <a:schemeClr val="accent6">
+                  <a:lumMod val="105000"/>
+                  <a:satMod val="103000"/>
+                  <a:tint val="73000"/>
+                </a:schemeClr>
+              </a:gs>
+              <a:gs pos="100000">
+                <a:schemeClr val="accent6">
+                  <a:lumMod val="105000"/>
+                  <a:satMod val="109000"/>
+                  <a:tint val="81000"/>
+                </a:schemeClr>
+              </a:gs>
+            </a:gsLst>
+          </a:gradFill>
           <a:ln/>
         </p:spPr>
         <p:style>
@@ -3067,7 +3091,9 @@
           <a:prstGeom prst="rect">
             <a:avLst/>
           </a:prstGeom>
-          <a:noFill/>
+          <a:solidFill>
+            <a:schemeClr val="accent2"/>
+          </a:solidFill>
         </p:spPr>
         <p:txBody>
           <a:bodyPr wrap="square" rtlCol="0">
@@ -3641,7 +3667,9 @@
           <a:prstGeom prst="rect">
             <a:avLst/>
           </a:prstGeom>
-          <a:noFill/>
+          <a:solidFill>
+            <a:schemeClr val="accent2"/>
+          </a:solidFill>
         </p:spPr>
         <p:txBody>
           <a:bodyPr wrap="square" rtlCol="0">
@@ -5434,7 +5462,9 @@
           <a:prstGeom prst="rect">
             <a:avLst/>
           </a:prstGeom>
-          <a:noFill/>
+          <a:solidFill>
+            <a:schemeClr val="accent2"/>
+          </a:solidFill>
         </p:spPr>
         <p:txBody>
           <a:bodyPr wrap="square" rtlCol="0">
@@ -7420,7 +7450,9 @@
           <a:prstGeom prst="rect">
             <a:avLst/>
           </a:prstGeom>
-          <a:noFill/>
+          <a:solidFill>
+            <a:schemeClr val="accent2"/>
+          </a:solidFill>
         </p:spPr>
         <p:txBody>
           <a:bodyPr wrap="square" rtlCol="0">
@@ -9453,7 +9485,9 @@
           <a:prstGeom prst="rect">
             <a:avLst/>
           </a:prstGeom>
-          <a:noFill/>
+          <a:solidFill>
+            <a:schemeClr val="accent2"/>
+          </a:solidFill>
         </p:spPr>
         <p:txBody>
           <a:bodyPr wrap="square" rtlCol="0">

</xml_diff>

<commit_message>
Added Survival App documentation Added three new activities for each quest Added Send button in all activities
</commit_message>
<xml_diff>
--- a/Docs/Survive Axon Demo design.pptx
+++ b/Docs/Survive Axon Demo design.pptx
@@ -110,7 +110,7 @@
   </p:defaultTextStyle>
   <p:extLst>
     <p:ext uri="{EFAFB233-063F-42B5-8137-9DF3F51BA10A}">
-      <p15:sldGuideLst xmlns:p15="http://schemas.microsoft.com/office/powerpoint/2012/main" xmlns=""/>
+      <p15:sldGuideLst xmlns="" xmlns:p15="http://schemas.microsoft.com/office/powerpoint/2012/main"/>
     </p:ext>
   </p:extLst>
 </p:presentation>
@@ -121,7 +121,7 @@
   <p:cmAuthor id="1" name="Patrick M" initials="PM" lastIdx="1" clrIdx="0">
     <p:extLst>
       <p:ext uri="{19B8F6BF-5375-455C-9EA6-DF929625EA0E}">
-        <p15:presenceInfo xmlns:p15="http://schemas.microsoft.com/office/powerpoint/2012/main" xmlns="" userId="293365ab57c4ddb0" providerId="Windows Live"/>
+        <p15:presenceInfo xmlns="" xmlns:p15="http://schemas.microsoft.com/office/powerpoint/2012/main" userId="293365ab57c4ddb0" providerId="Windows Live"/>
       </p:ext>
     </p:extLst>
   </p:cmAuthor>
@@ -258,7 +258,7 @@
             <a:fld id="{37724C19-980F-4321-AACF-69E1510F1043}" type="datetimeFigureOut">
               <a:rPr lang="en-US" smtClean="0"/>
               <a:pPr/>
-              <a:t>10/2/2016</a:t>
+              <a:t>10/10/2016</a:t>
             </a:fld>
             <a:endParaRPr lang="en-US" dirty="0"/>
           </a:p>
@@ -310,7 +310,7 @@
     </p:spTree>
     <p:extLst>
       <p:ext uri="{BB962C8B-B14F-4D97-AF65-F5344CB8AC3E}">
-        <p14:creationId xmlns:p14="http://schemas.microsoft.com/office/powerpoint/2010/main" xmlns="" val="4276609490"/>
+        <p14:creationId xmlns="" xmlns:p14="http://schemas.microsoft.com/office/powerpoint/2010/main" val="4276609490"/>
       </p:ext>
     </p:extLst>
   </p:cSld>
@@ -428,7 +428,7 @@
             <a:fld id="{37724C19-980F-4321-AACF-69E1510F1043}" type="datetimeFigureOut">
               <a:rPr lang="en-US" smtClean="0"/>
               <a:pPr/>
-              <a:t>10/2/2016</a:t>
+              <a:t>10/10/2016</a:t>
             </a:fld>
             <a:endParaRPr lang="en-US" dirty="0"/>
           </a:p>
@@ -480,7 +480,7 @@
     </p:spTree>
     <p:extLst>
       <p:ext uri="{BB962C8B-B14F-4D97-AF65-F5344CB8AC3E}">
-        <p14:creationId xmlns:p14="http://schemas.microsoft.com/office/powerpoint/2010/main" xmlns="" val="1177722305"/>
+        <p14:creationId xmlns="" xmlns:p14="http://schemas.microsoft.com/office/powerpoint/2010/main" val="1177722305"/>
       </p:ext>
     </p:extLst>
   </p:cSld>
@@ -608,7 +608,7 @@
             <a:fld id="{37724C19-980F-4321-AACF-69E1510F1043}" type="datetimeFigureOut">
               <a:rPr lang="en-US" smtClean="0"/>
               <a:pPr/>
-              <a:t>10/2/2016</a:t>
+              <a:t>10/10/2016</a:t>
             </a:fld>
             <a:endParaRPr lang="en-US" dirty="0"/>
           </a:p>
@@ -660,7 +660,7 @@
     </p:spTree>
     <p:extLst>
       <p:ext uri="{BB962C8B-B14F-4D97-AF65-F5344CB8AC3E}">
-        <p14:creationId xmlns:p14="http://schemas.microsoft.com/office/powerpoint/2010/main" xmlns="" val="3097804831"/>
+        <p14:creationId xmlns="" xmlns:p14="http://schemas.microsoft.com/office/powerpoint/2010/main" val="3097804831"/>
       </p:ext>
     </p:extLst>
   </p:cSld>
@@ -778,7 +778,7 @@
             <a:fld id="{37724C19-980F-4321-AACF-69E1510F1043}" type="datetimeFigureOut">
               <a:rPr lang="en-US" smtClean="0"/>
               <a:pPr/>
-              <a:t>10/2/2016</a:t>
+              <a:t>10/10/2016</a:t>
             </a:fld>
             <a:endParaRPr lang="en-US" dirty="0"/>
           </a:p>
@@ -830,7 +830,7 @@
     </p:spTree>
     <p:extLst>
       <p:ext uri="{BB962C8B-B14F-4D97-AF65-F5344CB8AC3E}">
-        <p14:creationId xmlns:p14="http://schemas.microsoft.com/office/powerpoint/2010/main" xmlns="" val="137394816"/>
+        <p14:creationId xmlns="" xmlns:p14="http://schemas.microsoft.com/office/powerpoint/2010/main" val="137394816"/>
       </p:ext>
     </p:extLst>
   </p:cSld>
@@ -1025,7 +1025,7 @@
             <a:fld id="{37724C19-980F-4321-AACF-69E1510F1043}" type="datetimeFigureOut">
               <a:rPr lang="en-US" smtClean="0"/>
               <a:pPr/>
-              <a:t>10/2/2016</a:t>
+              <a:t>10/10/2016</a:t>
             </a:fld>
             <a:endParaRPr lang="en-US" dirty="0"/>
           </a:p>
@@ -1077,7 +1077,7 @@
     </p:spTree>
     <p:extLst>
       <p:ext uri="{BB962C8B-B14F-4D97-AF65-F5344CB8AC3E}">
-        <p14:creationId xmlns:p14="http://schemas.microsoft.com/office/powerpoint/2010/main" xmlns="" val="3748074609"/>
+        <p14:creationId xmlns="" xmlns:p14="http://schemas.microsoft.com/office/powerpoint/2010/main" val="3748074609"/>
       </p:ext>
     </p:extLst>
   </p:cSld>
@@ -1256,7 +1256,7 @@
             <a:fld id="{37724C19-980F-4321-AACF-69E1510F1043}" type="datetimeFigureOut">
               <a:rPr lang="en-US" smtClean="0"/>
               <a:pPr/>
-              <a:t>10/2/2016</a:t>
+              <a:t>10/10/2016</a:t>
             </a:fld>
             <a:endParaRPr lang="en-US" dirty="0"/>
           </a:p>
@@ -1308,7 +1308,7 @@
     </p:spTree>
     <p:extLst>
       <p:ext uri="{BB962C8B-B14F-4D97-AF65-F5344CB8AC3E}">
-        <p14:creationId xmlns:p14="http://schemas.microsoft.com/office/powerpoint/2010/main" xmlns="" val="1654182424"/>
+        <p14:creationId xmlns="" xmlns:p14="http://schemas.microsoft.com/office/powerpoint/2010/main" val="1654182424"/>
       </p:ext>
     </p:extLst>
   </p:cSld>
@@ -1622,7 +1622,7 @@
             <a:fld id="{37724C19-980F-4321-AACF-69E1510F1043}" type="datetimeFigureOut">
               <a:rPr lang="en-US" smtClean="0"/>
               <a:pPr/>
-              <a:t>10/2/2016</a:t>
+              <a:t>10/10/2016</a:t>
             </a:fld>
             <a:endParaRPr lang="en-US" dirty="0"/>
           </a:p>
@@ -1674,7 +1674,7 @@
     </p:spTree>
     <p:extLst>
       <p:ext uri="{BB962C8B-B14F-4D97-AF65-F5344CB8AC3E}">
-        <p14:creationId xmlns:p14="http://schemas.microsoft.com/office/powerpoint/2010/main" xmlns="" val="4245890323"/>
+        <p14:creationId xmlns="" xmlns:p14="http://schemas.microsoft.com/office/powerpoint/2010/main" val="4245890323"/>
       </p:ext>
     </p:extLst>
   </p:cSld>
@@ -1741,7 +1741,7 @@
             <a:fld id="{37724C19-980F-4321-AACF-69E1510F1043}" type="datetimeFigureOut">
               <a:rPr lang="en-US" smtClean="0"/>
               <a:pPr/>
-              <a:t>10/2/2016</a:t>
+              <a:t>10/10/2016</a:t>
             </a:fld>
             <a:endParaRPr lang="en-US" dirty="0"/>
           </a:p>
@@ -1793,7 +1793,7 @@
     </p:spTree>
     <p:extLst>
       <p:ext uri="{BB962C8B-B14F-4D97-AF65-F5344CB8AC3E}">
-        <p14:creationId xmlns:p14="http://schemas.microsoft.com/office/powerpoint/2010/main" xmlns="" val="4136871283"/>
+        <p14:creationId xmlns="" xmlns:p14="http://schemas.microsoft.com/office/powerpoint/2010/main" val="4136871283"/>
       </p:ext>
     </p:extLst>
   </p:cSld>
@@ -1838,7 +1838,7 @@
             <a:fld id="{37724C19-980F-4321-AACF-69E1510F1043}" type="datetimeFigureOut">
               <a:rPr lang="en-US" smtClean="0"/>
               <a:pPr/>
-              <a:t>10/2/2016</a:t>
+              <a:t>10/10/2016</a:t>
             </a:fld>
             <a:endParaRPr lang="en-US" dirty="0"/>
           </a:p>
@@ -1890,7 +1890,7 @@
     </p:spTree>
     <p:extLst>
       <p:ext uri="{BB962C8B-B14F-4D97-AF65-F5344CB8AC3E}">
-        <p14:creationId xmlns:p14="http://schemas.microsoft.com/office/powerpoint/2010/main" xmlns="" val="2409841877"/>
+        <p14:creationId xmlns="" xmlns:p14="http://schemas.microsoft.com/office/powerpoint/2010/main" val="2409841877"/>
       </p:ext>
     </p:extLst>
   </p:cSld>
@@ -2115,7 +2115,7 @@
             <a:fld id="{37724C19-980F-4321-AACF-69E1510F1043}" type="datetimeFigureOut">
               <a:rPr lang="en-US" smtClean="0"/>
               <a:pPr/>
-              <a:t>10/2/2016</a:t>
+              <a:t>10/10/2016</a:t>
             </a:fld>
             <a:endParaRPr lang="en-US" dirty="0"/>
           </a:p>
@@ -2167,7 +2167,7 @@
     </p:spTree>
     <p:extLst>
       <p:ext uri="{BB962C8B-B14F-4D97-AF65-F5344CB8AC3E}">
-        <p14:creationId xmlns:p14="http://schemas.microsoft.com/office/powerpoint/2010/main" xmlns="" val="827629637"/>
+        <p14:creationId xmlns="" xmlns:p14="http://schemas.microsoft.com/office/powerpoint/2010/main" val="827629637"/>
       </p:ext>
     </p:extLst>
   </p:cSld>
@@ -2369,7 +2369,7 @@
             <a:fld id="{37724C19-980F-4321-AACF-69E1510F1043}" type="datetimeFigureOut">
               <a:rPr lang="en-US" smtClean="0"/>
               <a:pPr/>
-              <a:t>10/2/2016</a:t>
+              <a:t>10/10/2016</a:t>
             </a:fld>
             <a:endParaRPr lang="en-US" dirty="0"/>
           </a:p>
@@ -2421,7 +2421,7 @@
     </p:spTree>
     <p:extLst>
       <p:ext uri="{BB962C8B-B14F-4D97-AF65-F5344CB8AC3E}">
-        <p14:creationId xmlns:p14="http://schemas.microsoft.com/office/powerpoint/2010/main" xmlns="" val="3514816148"/>
+        <p14:creationId xmlns="" xmlns:p14="http://schemas.microsoft.com/office/powerpoint/2010/main" val="3514816148"/>
       </p:ext>
     </p:extLst>
   </p:cSld>
@@ -2582,7 +2582,7 @@
             <a:fld id="{37724C19-980F-4321-AACF-69E1510F1043}" type="datetimeFigureOut">
               <a:rPr lang="en-US" smtClean="0"/>
               <a:pPr/>
-              <a:t>10/2/2016</a:t>
+              <a:t>10/10/2016</a:t>
             </a:fld>
             <a:endParaRPr lang="en-US" dirty="0"/>
           </a:p>
@@ -2670,7 +2670,7 @@
     </p:spTree>
     <p:extLst>
       <p:ext uri="{BB962C8B-B14F-4D97-AF65-F5344CB8AC3E}">
-        <p14:creationId xmlns:p14="http://schemas.microsoft.com/office/powerpoint/2010/main" xmlns="" val="4213530645"/>
+        <p14:creationId xmlns="" xmlns:p14="http://schemas.microsoft.com/office/powerpoint/2010/main" val="4213530645"/>
       </p:ext>
     </p:extLst>
   </p:cSld>
@@ -3544,7 +3544,7 @@
     </p:spTree>
     <p:extLst>
       <p:ext uri="{BB962C8B-B14F-4D97-AF65-F5344CB8AC3E}">
-        <p14:creationId xmlns:p14="http://schemas.microsoft.com/office/powerpoint/2010/main" xmlns="" val="283767647"/>
+        <p14:creationId xmlns="" xmlns:p14="http://schemas.microsoft.com/office/powerpoint/2010/main" val="283767647"/>
       </p:ext>
     </p:extLst>
   </p:cSld>
@@ -3552,7 +3552,7 @@
     <a:masterClrMapping/>
   </p:clrMapOvr>
   <mc:AlternateContent xmlns:mc="http://schemas.openxmlformats.org/markup-compatibility/2006">
-    <mc:Choice xmlns:p14="http://schemas.microsoft.com/office/powerpoint/2010/main" xmlns="" Requires="p14">
+    <mc:Choice xmlns="" xmlns:p14="http://schemas.microsoft.com/office/powerpoint/2010/main" Requires="p14">
       <p:transition spd="slow" p14:dur="2000" advClick="0"/>
     </mc:Choice>
     <mc:Fallback>
@@ -5333,7 +5333,7 @@
     </p:spTree>
     <p:extLst>
       <p:ext uri="{BB962C8B-B14F-4D97-AF65-F5344CB8AC3E}">
-        <p14:creationId xmlns:p14="http://schemas.microsoft.com/office/powerpoint/2010/main" xmlns="" val="283767647"/>
+        <p14:creationId xmlns="" xmlns:p14="http://schemas.microsoft.com/office/powerpoint/2010/main" val="283767647"/>
       </p:ext>
     </p:extLst>
   </p:cSld>
@@ -5341,7 +5341,7 @@
     <a:masterClrMapping/>
   </p:clrMapOvr>
   <mc:AlternateContent xmlns:mc="http://schemas.openxmlformats.org/markup-compatibility/2006">
-    <mc:Choice xmlns:p14="http://schemas.microsoft.com/office/powerpoint/2010/main" xmlns="" Requires="p14">
+    <mc:Choice xmlns="" xmlns:p14="http://schemas.microsoft.com/office/powerpoint/2010/main" Requires="p14">
       <p:transition spd="slow" p14:dur="2000" advClick="0"/>
     </mc:Choice>
     <mc:Fallback>
@@ -7215,7 +7215,7 @@
     </p:spTree>
     <p:extLst>
       <p:ext uri="{BB962C8B-B14F-4D97-AF65-F5344CB8AC3E}">
-        <p14:creationId xmlns:p14="http://schemas.microsoft.com/office/powerpoint/2010/main" xmlns="" val="283767647"/>
+        <p14:creationId xmlns="" xmlns:p14="http://schemas.microsoft.com/office/powerpoint/2010/main" val="283767647"/>
       </p:ext>
     </p:extLst>
   </p:cSld>
@@ -7223,7 +7223,7 @@
     <a:masterClrMapping/>
   </p:clrMapOvr>
   <mc:AlternateContent xmlns:mc="http://schemas.openxmlformats.org/markup-compatibility/2006">
-    <mc:Choice xmlns:p14="http://schemas.microsoft.com/office/powerpoint/2010/main" xmlns="" Requires="p14">
+    <mc:Choice xmlns="" xmlns:p14="http://schemas.microsoft.com/office/powerpoint/2010/main" Requires="p14">
       <p:transition spd="slow" p14:dur="2000" advClick="0"/>
     </mc:Choice>
     <mc:Fallback>
@@ -9359,7 +9359,7 @@
     </p:spTree>
     <p:extLst>
       <p:ext uri="{BB962C8B-B14F-4D97-AF65-F5344CB8AC3E}">
-        <p14:creationId xmlns:p14="http://schemas.microsoft.com/office/powerpoint/2010/main" xmlns="" val="283767647"/>
+        <p14:creationId xmlns="" xmlns:p14="http://schemas.microsoft.com/office/powerpoint/2010/main" val="283767647"/>
       </p:ext>
     </p:extLst>
   </p:cSld>
@@ -9367,7 +9367,7 @@
     <a:masterClrMapping/>
   </p:clrMapOvr>
   <mc:AlternateContent xmlns:mc="http://schemas.openxmlformats.org/markup-compatibility/2006">
-    <mc:Choice xmlns:p14="http://schemas.microsoft.com/office/powerpoint/2010/main" xmlns="" Requires="p14">
+    <mc:Choice xmlns="" xmlns:p14="http://schemas.microsoft.com/office/powerpoint/2010/main" Requires="p14">
       <p:transition spd="slow" p14:dur="2000" advClick="0"/>
     </mc:Choice>
     <mc:Fallback>
@@ -10602,7 +10602,7 @@
     </p:spTree>
     <p:extLst>
       <p:ext uri="{BB962C8B-B14F-4D97-AF65-F5344CB8AC3E}">
-        <p14:creationId xmlns:p14="http://schemas.microsoft.com/office/powerpoint/2010/main" xmlns="" val="283767647"/>
+        <p14:creationId xmlns="" xmlns:p14="http://schemas.microsoft.com/office/powerpoint/2010/main" val="283767647"/>
       </p:ext>
     </p:extLst>
   </p:cSld>
@@ -10610,7 +10610,7 @@
     <a:masterClrMapping/>
   </p:clrMapOvr>
   <mc:AlternateContent xmlns:mc="http://schemas.openxmlformats.org/markup-compatibility/2006">
-    <mc:Choice xmlns:p14="http://schemas.microsoft.com/office/powerpoint/2010/main" xmlns="" Requires="p14">
+    <mc:Choice xmlns="" xmlns:p14="http://schemas.microsoft.com/office/powerpoint/2010/main" Requires="p14">
       <p:transition spd="slow" p14:dur="2000" advClick="0"/>
     </mc:Choice>
     <mc:Fallback>
@@ -10916,7 +10916,7 @@
   <a:extraClrSchemeLst/>
   <a:extLst>
     <a:ext uri="{05A4C25C-085E-4340-85A3-A5531E510DB2}">
-      <thm15:themeFamily xmlns:thm15="http://schemas.microsoft.com/office/thememl/2012/main" xmlns="" name="Office Theme" id="{62F939B6-93AF-4DB8-9C6B-D6C7DFDC589F}" vid="{4A3C46E8-61CC-4603-A589-7422A47A8E4A}"/>
+      <thm15:themeFamily xmlns="" xmlns:thm15="http://schemas.microsoft.com/office/thememl/2012/main" name="Office Theme" id="{62F939B6-93AF-4DB8-9C6B-D6C7DFDC589F}" vid="{4A3C46E8-61CC-4603-A589-7422A47A8E4A}"/>
     </a:ext>
   </a:extLst>
 </a:theme>

</xml_diff>